<commit_message>
Präsentationen und Beschreibungen zum vierten Nachmittag
</commit_message>
<xml_diff>
--- a/Präsentationen/Python Einführung.pptx
+++ b/Präsentationen/Python Einführung.pptx
@@ -412,7 +412,7 @@
                   <a:schemeClr val="tx2"/>
                 </a:solidFill>
               </a:rPr>
-              <a:t>13.03.2019</a:t>
+              <a:t>20.03.2019</a:t>
             </a:fld>
             <a:endParaRPr lang="de-DE">
               <a:solidFill>
@@ -762,7 +762,7 @@
             <a:fld id="{B4113CCE-1A1A-46DB-884A-AE560F65C3AF}" type="datetimeFigureOut">
               <a:rPr lang="de-DE" smtClean="0"/>
               <a:pPr/>
-              <a:t>13.03.2019</a:t>
+              <a:t>20.03.2019</a:t>
             </a:fld>
             <a:endParaRPr lang="de-DE"/>
           </a:p>
@@ -1494,11 +1494,7 @@
           <a:p>
             <a:r>
               <a:rPr lang="de-DE" dirty="0" smtClean="0"/>
-              <a:t>IDLE ist die Abkürzung für Integrated </a:t>
-            </a:r>
-            <a:r>
-              <a:rPr lang="de-DE" dirty="0" smtClean="0"/>
-              <a:t>Development </a:t>
+              <a:t>IDLE ist die Abkürzung für Integrated Development </a:t>
             </a:r>
             <a:r>
               <a:rPr lang="de-DE" dirty="0" err="1" smtClean="0"/>
@@ -1506,11 +1502,7 @@
             </a:r>
             <a:r>
               <a:rPr lang="de-DE" dirty="0" smtClean="0"/>
-              <a:t> Learning </a:t>
-            </a:r>
-            <a:r>
-              <a:rPr lang="de-DE" dirty="0" smtClean="0"/>
-              <a:t>Environment.</a:t>
+              <a:t> Learning Environment.</a:t>
             </a:r>
           </a:p>
           <a:p>
@@ -5688,15 +5680,7 @@
             </a:r>
             <a:r>
               <a:rPr lang="de-DE" dirty="0" smtClean="0"/>
-              <a:t>Das </a:t>
-            </a:r>
-            <a:r>
-              <a:rPr lang="de-DE" dirty="0" smtClean="0"/>
-              <a:t>Rad nicht neu erfinden: wiederverwenden von fremdem </a:t>
-            </a:r>
-            <a:r>
-              <a:rPr lang="de-DE" dirty="0" smtClean="0"/>
-              <a:t>Code.</a:t>
+              <a:t>Das Rad nicht neu erfinden: wiederverwenden von fremdem Code.</a:t>
             </a:r>
           </a:p>
           <a:p>
@@ -5942,15 +5926,7 @@
             </a:r>
             <a:r>
               <a:rPr lang="de-DE" baseline="0" dirty="0" smtClean="0"/>
-              <a:t> Leben erleichtern. </a:t>
-            </a:r>
-            <a:r>
-              <a:rPr lang="de-DE" baseline="0" dirty="0" smtClean="0"/>
-              <a:t>Mit Bibliotheken kann Spezialwissen von einzelnen Fachleuten an andere Personen übergeben werden. </a:t>
-            </a:r>
-            <a:r>
-              <a:rPr lang="de-DE" baseline="0" dirty="0" smtClean="0"/>
-              <a:t>Zu den Vorteilen gehört, dass man bereits getestete Algorithmen als Teilergebnis nutzen kann und somit bei komplexen Problemen schneller zu Ziel kommt. </a:t>
+              <a:t> Leben erleichtern. Mit Bibliotheken kann Spezialwissen von einzelnen Fachleuten an andere Personen übergeben werden. Zu den Vorteilen gehört, dass man bereits getestete Algorithmen als Teilergebnis nutzen kann und somit bei komplexen Problemen schneller zu Ziel kommt. </a:t>
             </a:r>
           </a:p>
           <a:p>
@@ -6185,11 +6161,7 @@
           <a:p>
             <a:r>
               <a:rPr lang="de-DE" dirty="0" smtClean="0"/>
-              <a:t>Bild</a:t>
-            </a:r>
-            <a:r>
-              <a:rPr lang="de-DE" dirty="0" smtClean="0"/>
-              <a:t>: https://en.wikipedia.org/wiki/Monty_Python</a:t>
+              <a:t>Bild: https://en.wikipedia.org/wiki/Monty_Python</a:t>
             </a:r>
           </a:p>
           <a:p>
@@ -6696,7 +6668,7 @@
           <a:p>
             <a:fld id="{B629FF5D-C1A5-48C8-8545-07B501EE72D4}" type="datetime1">
               <a:rPr lang="de-DE" smtClean="0"/>
-              <a:t>13.03.2019</a:t>
+              <a:t>20.03.2019</a:t>
             </a:fld>
             <a:endParaRPr lang="de-DE"/>
           </a:p>
@@ -6881,7 +6853,7 @@
           <a:p>
             <a:fld id="{8C4C0ABC-76E8-4FF4-86A8-DEC3D511F3B2}" type="datetime1">
               <a:rPr lang="de-DE" smtClean="0"/>
-              <a:t>13.03.2019</a:t>
+              <a:t>20.03.2019</a:t>
             </a:fld>
             <a:endParaRPr lang="de-DE"/>
           </a:p>
@@ -7038,7 +7010,7 @@
           <a:p>
             <a:fld id="{E187AA6A-184D-40F7-A482-E244A841FFB7}" type="datetime1">
               <a:rPr lang="de-DE" smtClean="0"/>
-              <a:t>13.03.2019</a:t>
+              <a:t>20.03.2019</a:t>
             </a:fld>
             <a:endParaRPr lang="de-DE"/>
           </a:p>
@@ -7305,7 +7277,7 @@
           <a:p>
             <a:fld id="{EF4D3471-921C-4F2B-95F2-45CF9F80E55E}" type="datetime1">
               <a:rPr lang="de-DE" smtClean="0"/>
-              <a:t>13.03.2019</a:t>
+              <a:t>20.03.2019</a:t>
             </a:fld>
             <a:endParaRPr lang="de-DE"/>
           </a:p>
@@ -7486,7 +7458,7 @@
           <a:p>
             <a:fld id="{98DD8D00-4265-43DF-9C4A-DE9BEC1EA000}" type="datetime1">
               <a:rPr lang="de-DE" smtClean="0"/>
-              <a:t>13.03.2019</a:t>
+              <a:t>20.03.2019</a:t>
             </a:fld>
             <a:endParaRPr lang="de-DE"/>
           </a:p>
@@ -7615,7 +7587,7 @@
           <a:p>
             <a:fld id="{B2FF20D5-ABA5-4FD3-B0E4-58D845B14A52}" type="datetime1">
               <a:rPr lang="de-DE" smtClean="0"/>
-              <a:t>13.03.2019</a:t>
+              <a:t>20.03.2019</a:t>
             </a:fld>
             <a:endParaRPr lang="de-DE"/>
           </a:p>
@@ -7721,7 +7693,7 @@
           <a:p>
             <a:fld id="{1BFEE2EF-8B70-47BE-8C03-E08F3A67F2E6}" type="datetime1">
               <a:rPr lang="de-DE" smtClean="0"/>
-              <a:t>13.03.2019</a:t>
+              <a:t>20.03.2019</a:t>
             </a:fld>
             <a:endParaRPr lang="de-DE"/>
           </a:p>
@@ -7854,7 +7826,7 @@
           <a:p>
             <a:fld id="{CDF945CE-5888-4C05-BE25-1B858D440F1B}" type="datetime1">
               <a:rPr lang="de-DE" smtClean="0"/>
-              <a:t>13.03.2019</a:t>
+              <a:t>20.03.2019</a:t>
             </a:fld>
             <a:endParaRPr lang="de-DE"/>
           </a:p>
@@ -8037,7 +8009,7 @@
           <a:p>
             <a:fld id="{A82F6A88-870F-42E1-80C8-044E8549C5CE}" type="datetime1">
               <a:rPr lang="de-DE" smtClean="0"/>
-              <a:t>13.03.2019</a:t>
+              <a:t>20.03.2019</a:t>
             </a:fld>
             <a:endParaRPr lang="de-DE" dirty="0"/>
           </a:p>
@@ -8228,7 +8200,7 @@
           <a:p>
             <a:fld id="{93E9CE4B-3359-4535-8239-A69CF3DCEA4F}" type="datetime1">
               <a:rPr lang="de-DE" smtClean="0"/>
-              <a:t>13.03.2019</a:t>
+              <a:t>20.03.2019</a:t>
             </a:fld>
             <a:endParaRPr lang="de-DE"/>
           </a:p>
@@ -8437,7 +8409,7 @@
           <a:p>
             <a:fld id="{35926458-0D16-4690-8BEF-D69D90335FEC}" type="datetime1">
               <a:rPr lang="de-DE" smtClean="0"/>
-              <a:t>13.03.2019</a:t>
+              <a:t>20.03.2019</a:t>
             </a:fld>
             <a:endParaRPr lang="de-DE"/>
           </a:p>
@@ -8862,7 +8834,7 @@
           <a:p>
             <a:fld id="{ED031EB9-BFFC-4756-816A-B229AB007552}" type="datetime1">
               <a:rPr lang="de-DE" smtClean="0"/>
-              <a:t>13.03.2019</a:t>
+              <a:t>20.03.2019</a:t>
             </a:fld>
             <a:endParaRPr lang="de-DE" dirty="0"/>
           </a:p>
@@ -9446,7 +9418,7 @@
           <a:p>
             <a:fld id="{A82F6A88-870F-42E1-80C8-044E8549C5CE}" type="datetime1">
               <a:rPr lang="de-DE" smtClean="0"/>
-              <a:t>13.03.2019</a:t>
+              <a:t>20.03.2019</a:t>
             </a:fld>
             <a:endParaRPr lang="de-DE" dirty="0"/>
           </a:p>
@@ -10086,7 +10058,7 @@
           <a:p>
             <a:fld id="{CE0EB4A9-3129-4D94-9276-6EFCF725FEB5}" type="datetime1">
               <a:rPr lang="de-DE" smtClean="0"/>
-              <a:t>13.03.2019</a:t>
+              <a:t>20.03.2019</a:t>
             </a:fld>
             <a:endParaRPr lang="de-DE"/>
           </a:p>
@@ -10290,7 +10262,7 @@
           <a:p>
             <a:fld id="{92A8BBDF-07DD-4D85-AA35-D770B117BEF8}" type="datetime1">
               <a:rPr lang="de-DE" smtClean="0"/>
-              <a:t>13.03.2019</a:t>
+              <a:t>20.03.2019</a:t>
             </a:fld>
             <a:endParaRPr lang="de-DE"/>
           </a:p>
@@ -10530,7 +10502,7 @@
           <a:p>
             <a:fld id="{32A94186-FFAA-4919-B83F-24FAACFCEBBE}" type="datetime1">
               <a:rPr lang="de-DE" smtClean="0"/>
-              <a:t>13.03.2019</a:t>
+              <a:t>20.03.2019</a:t>
             </a:fld>
             <a:endParaRPr lang="de-DE"/>
           </a:p>
@@ -10831,7 +10803,7 @@
           <a:p>
             <a:fld id="{83468713-7584-40CF-B812-011DDBE4027E}" type="datetime1">
               <a:rPr lang="de-DE" smtClean="0"/>
-              <a:t>13.03.2019</a:t>
+              <a:t>20.03.2019</a:t>
             </a:fld>
             <a:endParaRPr lang="de-DE"/>
           </a:p>
@@ -11050,7 +11022,7 @@
           <a:p>
             <a:fld id="{A593EC17-1A47-412F-8CE6-B549CABBD4A8}" type="datetime1">
               <a:rPr lang="de-DE" smtClean="0"/>
-              <a:t>13.03.2019</a:t>
+              <a:t>20.03.2019</a:t>
             </a:fld>
             <a:endParaRPr lang="de-DE"/>
           </a:p>
@@ -11250,7 +11222,7 @@
           <a:p>
             <a:fld id="{3EFE85D8-2AAB-493B-BF38-280230E506B2}" type="datetime1">
               <a:rPr lang="de-DE" smtClean="0"/>
-              <a:t>13.03.2019</a:t>
+              <a:t>20.03.2019</a:t>
             </a:fld>
             <a:endParaRPr lang="de-DE"/>
           </a:p>
@@ -11511,7 +11483,7 @@
           <a:p>
             <a:fld id="{1F15A383-2A7D-442F-A80A-F698B5F779ED}" type="datetime1">
               <a:rPr lang="de-DE" smtClean="0"/>
-              <a:t>13.03.2019</a:t>
+              <a:t>20.03.2019</a:t>
             </a:fld>
             <a:endParaRPr lang="de-DE"/>
           </a:p>
@@ -11768,7 +11740,7 @@
           <a:p>
             <a:fld id="{17A47A22-FB29-4A9E-B830-EB8CE7EF8B44}" type="datetime1">
               <a:rPr lang="de-DE" smtClean="0"/>
-              <a:t>13.03.2019</a:t>
+              <a:t>20.03.2019</a:t>
             </a:fld>
             <a:endParaRPr lang="de-DE"/>
           </a:p>
@@ -12015,7 +11987,7 @@
           <a:p>
             <a:fld id="{249F8F50-D413-4C42-B728-AB71DB385A94}" type="datetime1">
               <a:rPr lang="de-DE" smtClean="0"/>
-              <a:t>13.03.2019</a:t>
+              <a:t>20.03.2019</a:t>
             </a:fld>
             <a:endParaRPr lang="de-DE"/>
           </a:p>
@@ -12317,7 +12289,7 @@
           <a:p>
             <a:fld id="{7F662C5E-2FD1-46D7-BED1-038091AD8DAE}" type="datetime1">
               <a:rPr lang="de-DE" smtClean="0"/>
-              <a:t>13.03.2019</a:t>
+              <a:t>20.03.2019</a:t>
             </a:fld>
             <a:endParaRPr lang="de-DE"/>
           </a:p>
@@ -12571,7 +12543,7 @@
           <a:p>
             <a:fld id="{4447688E-1776-4428-B0A5-F175CECF7938}" type="datetime1">
               <a:rPr lang="de-DE" smtClean="0"/>
-              <a:t>13.03.2019</a:t>
+              <a:t>20.03.2019</a:t>
             </a:fld>
             <a:endParaRPr lang="de-DE"/>
           </a:p>
@@ -12761,7 +12733,7 @@
           <a:p>
             <a:fld id="{0E7DC1E0-BDA5-44C8-9CB7-0226ECCB4287}" type="datetime1">
               <a:rPr lang="de-DE" smtClean="0"/>
-              <a:t>13.03.2019</a:t>
+              <a:t>20.03.2019</a:t>
             </a:fld>
             <a:endParaRPr lang="de-DE"/>
           </a:p>
@@ -12955,7 +12927,7 @@
           <a:p>
             <a:fld id="{56B33E50-8FD2-4CEE-972A-D49A363CE77B}" type="datetime1">
               <a:rPr lang="de-DE" smtClean="0"/>
-              <a:t>13.03.2019</a:t>
+              <a:t>20.03.2019</a:t>
             </a:fld>
             <a:endParaRPr lang="de-DE"/>
           </a:p>
@@ -13293,7 +13265,7 @@
           <a:p>
             <a:fld id="{C1A449D8-E3B9-4E0B-9A9A-61F4E8B35412}" type="datetime1">
               <a:rPr lang="de-DE" smtClean="0"/>
-              <a:t>13.03.2019</a:t>
+              <a:t>20.03.2019</a:t>
             </a:fld>
             <a:endParaRPr lang="de-DE"/>
           </a:p>
@@ -13656,7 +13628,7 @@
           <a:p>
             <a:fld id="{1EC4E88F-121A-4BCB-BF0E-D3797C910E03}" type="datetime1">
               <a:rPr lang="de-DE" smtClean="0"/>
-              <a:t>13.03.2019</a:t>
+              <a:t>20.03.2019</a:t>
             </a:fld>
             <a:endParaRPr lang="de-DE"/>
           </a:p>
@@ -14119,7 +14091,7 @@
           <a:p>
             <a:fld id="{A8654AF1-82C6-4ADC-A7F2-B4AEE1A98348}" type="datetime1">
               <a:rPr lang="de-DE" smtClean="0"/>
-              <a:t>13.03.2019</a:t>
+              <a:t>20.03.2019</a:t>
             </a:fld>
             <a:endParaRPr lang="de-DE"/>
           </a:p>
@@ -14513,7 +14485,7 @@
           <a:p>
             <a:fld id="{ACD76AD2-EB50-4CAA-B749-1CA7AD92AF96}" type="datetime1">
               <a:rPr lang="de-DE" smtClean="0"/>
-              <a:t>13.03.2019</a:t>
+              <a:t>20.03.2019</a:t>
             </a:fld>
             <a:endParaRPr lang="de-DE"/>
           </a:p>
@@ -14660,7 +14632,7 @@
             <a:fld id="{01FACE75-9AC0-4AFD-B75F-251826FD2CBC}" type="datetime1">
               <a:rPr lang="de-DE" smtClean="0"/>
               <a:pPr/>
-              <a:t>13.03.2019</a:t>
+              <a:t>20.03.2019</a:t>
             </a:fld>
             <a:endParaRPr lang="de-DE"/>
           </a:p>
@@ -15020,7 +14992,7 @@
           <a:p>
             <a:fld id="{1C7419EF-796B-42D8-AB5A-3E8CCB0ED8CB}" type="datetime1">
               <a:rPr lang="de-DE" smtClean="0"/>
-              <a:t>13.03.2019</a:t>
+              <a:t>20.03.2019</a:t>
             </a:fld>
             <a:endParaRPr lang="de-DE"/>
           </a:p>
@@ -15307,7 +15279,7 @@
           <a:p>
             <a:fld id="{212C206A-EE2D-4D5E-9C6B-9F484E460468}" type="datetime1">
               <a:rPr lang="de-DE" smtClean="0"/>
-              <a:t>13.03.2019</a:t>
+              <a:t>20.03.2019</a:t>
             </a:fld>
             <a:endParaRPr lang="de-DE"/>
           </a:p>
@@ -15702,7 +15674,7 @@
           <a:p>
             <a:fld id="{4B25BD17-D927-49E2-B452-E213A9E194A6}" type="datetime1">
               <a:rPr lang="de-DE" smtClean="0"/>
-              <a:t>13.03.2019</a:t>
+              <a:t>20.03.2019</a:t>
             </a:fld>
             <a:endParaRPr lang="de-DE"/>
           </a:p>
@@ -15979,7 +15951,7 @@
           <a:p>
             <a:fld id="{E1A6A946-6638-4186-B043-3EA9BD1D6DDA}" type="datetime1">
               <a:rPr lang="de-DE" smtClean="0"/>
-              <a:t>13.03.2019</a:t>
+              <a:t>20.03.2019</a:t>
             </a:fld>
             <a:endParaRPr lang="de-DE"/>
           </a:p>
@@ -16206,7 +16178,7 @@
           <a:p>
             <a:fld id="{C1921D34-303B-4044-A77B-A7659C9CFEF9}" type="datetime1">
               <a:rPr lang="de-DE" smtClean="0"/>
-              <a:t>13.03.2019</a:t>
+              <a:t>20.03.2019</a:t>
             </a:fld>
             <a:endParaRPr lang="de-DE"/>
           </a:p>
@@ -16814,7 +16786,7 @@
           <a:p>
             <a:fld id="{CF4085D9-06B7-4FD4-909D-1B487320FEF5}" type="datetime1">
               <a:rPr lang="de-DE" smtClean="0"/>
-              <a:t>13.03.2019</a:t>
+              <a:t>20.03.2019</a:t>
             </a:fld>
             <a:endParaRPr lang="de-DE"/>
           </a:p>
@@ -17205,7 +17177,7 @@
           <a:p>
             <a:fld id="{E6477017-8420-453C-A4F5-9874759FFB1C}" type="datetime1">
               <a:rPr lang="de-DE" smtClean="0"/>
-              <a:t>13.03.2019</a:t>
+              <a:t>20.03.2019</a:t>
             </a:fld>
             <a:endParaRPr lang="de-DE"/>
           </a:p>
@@ -17389,7 +17361,7 @@
           <a:p>
             <a:fld id="{8D936150-CEBE-4D0E-AA56-CD92215D4299}" type="datetime1">
               <a:rPr lang="de-DE" smtClean="0"/>
-              <a:t>13.03.2019</a:t>
+              <a:t>20.03.2019</a:t>
             </a:fld>
             <a:endParaRPr lang="de-DE"/>
           </a:p>
@@ -17920,7 +17892,7 @@
           <a:p>
             <a:fld id="{C251BD82-81F5-4AB8-95F1-D612B114E619}" type="datetime1">
               <a:rPr lang="de-DE" smtClean="0"/>
-              <a:t>13.03.2019</a:t>
+              <a:t>20.03.2019</a:t>
             </a:fld>
             <a:endParaRPr lang="de-DE"/>
           </a:p>
@@ -18174,7 +18146,7 @@
           <a:p>
             <a:fld id="{ABE81AD2-829D-4072-9688-6B66C98C624B}" type="datetime1">
               <a:rPr lang="de-DE" smtClean="0"/>
-              <a:t>13.03.2019</a:t>
+              <a:t>20.03.2019</a:t>
             </a:fld>
             <a:endParaRPr lang="de-DE"/>
           </a:p>
@@ -18416,7 +18388,7 @@
           <a:p>
             <a:fld id="{6EF1BF9D-B1FC-41DE-A4C6-8332BF0AAB8C}" type="datetime1">
               <a:rPr lang="de-DE" smtClean="0"/>
-              <a:t>13.03.2019</a:t>
+              <a:t>20.03.2019</a:t>
             </a:fld>
             <a:endParaRPr lang="de-DE"/>
           </a:p>
@@ -18701,7 +18673,7 @@
           <a:p>
             <a:fld id="{108BF655-CA69-4CA1-8392-0482341FA3AB}" type="datetime1">
               <a:rPr lang="de-DE" smtClean="0"/>
-              <a:t>13.03.2019</a:t>
+              <a:t>20.03.2019</a:t>
             </a:fld>
             <a:endParaRPr lang="de-DE"/>
           </a:p>
@@ -18891,7 +18863,7 @@
           <a:p>
             <a:fld id="{06A903DF-1128-46CD-B417-38F6214F535A}" type="datetime1">
               <a:rPr lang="de-DE" smtClean="0"/>
-              <a:t>13.03.2019</a:t>
+              <a:t>20.03.2019</a:t>
             </a:fld>
             <a:endParaRPr lang="de-DE"/>
           </a:p>
@@ -19311,7 +19283,7 @@
           <a:p>
             <a:fld id="{540273FD-E4DC-432A-B7EC-710AF36B5BF9}" type="datetime1">
               <a:rPr lang="de-DE" smtClean="0"/>
-              <a:t>13.03.2019</a:t>
+              <a:t>20.03.2019</a:t>
             </a:fld>
             <a:endParaRPr lang="de-DE"/>
           </a:p>
@@ -19672,7 +19644,7 @@
           <a:p>
             <a:fld id="{F5A85240-7C7D-40AC-881C-FD470AC28E28}" type="datetime1">
               <a:rPr lang="de-DE" smtClean="0"/>
-              <a:t>13.03.2019</a:t>
+              <a:t>20.03.2019</a:t>
             </a:fld>
             <a:endParaRPr lang="de-DE"/>
           </a:p>
@@ -19954,7 +19926,7 @@
           <a:p>
             <a:fld id="{8E075C87-E077-4B9A-A783-FA839FDB07B3}" type="datetime1">
               <a:rPr lang="de-DE" smtClean="0"/>
-              <a:t>13.03.2019</a:t>
+              <a:t>20.03.2019</a:t>
             </a:fld>
             <a:endParaRPr lang="de-DE"/>
           </a:p>
@@ -20336,7 +20308,7 @@
           <a:p>
             <a:fld id="{DC06A4FB-3FEC-46DD-B898-227DF1300745}" type="datetime1">
               <a:rPr lang="de-DE" smtClean="0"/>
-              <a:t>13.03.2019</a:t>
+              <a:t>20.03.2019</a:t>
             </a:fld>
             <a:endParaRPr lang="de-DE"/>
           </a:p>
@@ -20639,7 +20611,7 @@
           <a:p>
             <a:fld id="{3B98499C-917A-4F26-B40E-695BD0FFC74B}" type="datetime1">
               <a:rPr lang="de-DE" smtClean="0"/>
-              <a:t>13.03.2019</a:t>
+              <a:t>20.03.2019</a:t>
             </a:fld>
             <a:endParaRPr lang="de-DE"/>
           </a:p>
@@ -20986,7 +20958,7 @@
           <a:p>
             <a:fld id="{5246C73B-41C6-44B0-8E99-FE85FF2BCCB2}" type="datetime1">
               <a:rPr lang="de-DE" smtClean="0"/>
-              <a:t>13.03.2019</a:t>
+              <a:t>20.03.2019</a:t>
             </a:fld>
             <a:endParaRPr lang="de-DE"/>
           </a:p>
@@ -21464,7 +21436,7 @@
           <a:p>
             <a:fld id="{49C6F141-7B96-497F-93A3-E688D5682946}" type="datetime1">
               <a:rPr lang="de-DE" smtClean="0"/>
-              <a:t>13.03.2019</a:t>
+              <a:t>20.03.2019</a:t>
             </a:fld>
             <a:endParaRPr lang="de-DE"/>
           </a:p>
@@ -21654,7 +21626,7 @@
           <a:p>
             <a:fld id="{1D88C1FA-871A-4A05-A6B3-E88443BF9D3D}" type="datetime1">
               <a:rPr lang="de-DE" smtClean="0"/>
-              <a:t>13.03.2019</a:t>
+              <a:t>20.03.2019</a:t>
             </a:fld>
             <a:endParaRPr lang="de-DE"/>
           </a:p>
@@ -22215,7 +22187,7 @@
           <a:p>
             <a:fld id="{2E0FAE72-4302-4067-A7B4-5361ED9C2922}" type="datetime1">
               <a:rPr lang="de-DE" smtClean="0"/>
-              <a:t>13.03.2019</a:t>
+              <a:t>20.03.2019</a:t>
             </a:fld>
             <a:endParaRPr lang="de-DE"/>
           </a:p>
@@ -22615,7 +22587,7 @@
           <a:p>
             <a:fld id="{BB9862A8-04CB-49F3-B3A2-15F0F5882BD1}" type="datetime1">
               <a:rPr lang="de-DE" smtClean="0"/>
-              <a:t>13.03.2019</a:t>
+              <a:t>20.03.2019</a:t>
             </a:fld>
             <a:endParaRPr lang="de-DE"/>
           </a:p>
@@ -23004,7 +22976,7 @@
           <a:p>
             <a:fld id="{793655B7-CBEA-457D-BD5B-ACC421B4D76A}" type="datetime1">
               <a:rPr lang="de-DE" smtClean="0"/>
-              <a:t>13.03.2019</a:t>
+              <a:t>20.03.2019</a:t>
             </a:fld>
             <a:endParaRPr lang="de-DE"/>
           </a:p>
@@ -23194,7 +23166,7 @@
           <a:p>
             <a:fld id="{FC061112-BDD9-4A67-BD62-58AEF83B3F31}" type="datetime1">
               <a:rPr lang="de-DE" smtClean="0"/>
-              <a:t>13.03.2019</a:t>
+              <a:t>20.03.2019</a:t>
             </a:fld>
             <a:endParaRPr lang="de-DE"/>
           </a:p>
@@ -23309,7 +23281,7 @@
 </file>
 
 <file path=ppt/slides/slide49.xml><?xml version="1.0" encoding="utf-8"?>
-<p:sld xmlns:a="http://schemas.openxmlformats.org/drawingml/2006/main" xmlns:r="http://schemas.openxmlformats.org/officeDocument/2006/relationships" xmlns:p="http://schemas.openxmlformats.org/presentationml/2006/main">
+<p:sld xmlns:a="http://schemas.openxmlformats.org/drawingml/2006/main" xmlns:r="http://schemas.openxmlformats.org/officeDocument/2006/relationships" xmlns:p="http://schemas.openxmlformats.org/presentationml/2006/main" show="0">
   <p:cSld>
     <p:spTree>
       <p:nvGrpSpPr>
@@ -23612,7 +23584,7 @@
           <a:p>
             <a:fld id="{3B41BE4B-80DE-4C35-9D51-52DD4B79173A}" type="datetime1">
               <a:rPr lang="de-DE" smtClean="0"/>
-              <a:t>13.03.2019</a:t>
+              <a:t>20.03.2019</a:t>
             </a:fld>
             <a:endParaRPr lang="de-DE"/>
           </a:p>
@@ -23710,11 +23682,11 @@
   <p:clrMapOvr>
     <a:masterClrMapping/>
   </p:clrMapOvr>
-  <mc:AlternateContent xmlns:mc="http://schemas.openxmlformats.org/markup-compatibility/2006" xmlns:p14="http://schemas.microsoft.com/office/powerpoint/2010/main">
-    <mc:Choice Requires="p14">
+  <mc:AlternateContent xmlns:mc="http://schemas.openxmlformats.org/markup-compatibility/2006">
+    <mc:Choice xmlns:p14="http://schemas.microsoft.com/office/powerpoint/2010/main" Requires="p14">
       <p:transition p14:dur="0"/>
     </mc:Choice>
-    <mc:Fallback xmlns="">
+    <mc:Fallback>
       <p:transition/>
     </mc:Fallback>
   </mc:AlternateContent>
@@ -23837,7 +23809,7 @@
           <a:p>
             <a:fld id="{A6B8CC01-C994-4F6F-A4B1-704737F690FD}" type="datetime1">
               <a:rPr lang="de-DE" smtClean="0"/>
-              <a:t>13.03.2019</a:t>
+              <a:t>20.03.2019</a:t>
             </a:fld>
             <a:endParaRPr lang="de-DE"/>
           </a:p>
@@ -24146,7 +24118,7 @@
 </file>
 
 <file path=ppt/slides/slide50.xml><?xml version="1.0" encoding="utf-8"?>
-<p:sld xmlns:a="http://schemas.openxmlformats.org/drawingml/2006/main" xmlns:r="http://schemas.openxmlformats.org/officeDocument/2006/relationships" xmlns:p="http://schemas.openxmlformats.org/presentationml/2006/main">
+<p:sld xmlns:a="http://schemas.openxmlformats.org/drawingml/2006/main" xmlns:r="http://schemas.openxmlformats.org/officeDocument/2006/relationships" xmlns:p="http://schemas.openxmlformats.org/presentationml/2006/main" show="0">
   <p:cSld>
     <p:spTree>
       <p:nvGrpSpPr>
@@ -24531,7 +24503,7 @@
           <a:p>
             <a:fld id="{B5B31E73-7F2F-4C80-B0B3-B7B75D1A2D3F}" type="datetime1">
               <a:rPr lang="de-DE" smtClean="0"/>
-              <a:t>13.03.2019</a:t>
+              <a:t>20.03.2019</a:t>
             </a:fld>
             <a:endParaRPr lang="de-DE"/>
           </a:p>
@@ -24629,11 +24601,11 @@
   <p:clrMapOvr>
     <a:masterClrMapping/>
   </p:clrMapOvr>
-  <mc:AlternateContent xmlns:mc="http://schemas.openxmlformats.org/markup-compatibility/2006" xmlns:p14="http://schemas.microsoft.com/office/powerpoint/2010/main">
-    <mc:Choice Requires="p14">
+  <mc:AlternateContent xmlns:mc="http://schemas.openxmlformats.org/markup-compatibility/2006">
+    <mc:Choice xmlns:p14="http://schemas.microsoft.com/office/powerpoint/2010/main" Requires="p14">
       <p:transition p14:dur="0"/>
     </mc:Choice>
-    <mc:Fallback xmlns="">
+    <mc:Fallback>
       <p:transition/>
     </mc:Fallback>
   </mc:AlternateContent>
@@ -24648,7 +24620,7 @@
 </file>
 
 <file path=ppt/slides/slide51.xml><?xml version="1.0" encoding="utf-8"?>
-<p:sld xmlns:a="http://schemas.openxmlformats.org/drawingml/2006/main" xmlns:r="http://schemas.openxmlformats.org/officeDocument/2006/relationships" xmlns:p="http://schemas.openxmlformats.org/presentationml/2006/main">
+<p:sld xmlns:a="http://schemas.openxmlformats.org/drawingml/2006/main" xmlns:r="http://schemas.openxmlformats.org/officeDocument/2006/relationships" xmlns:p="http://schemas.openxmlformats.org/presentationml/2006/main" show="0">
   <p:cSld>
     <p:spTree>
       <p:nvGrpSpPr>
@@ -24730,7 +24702,7 @@
           <a:p>
             <a:fld id="{BC49A95B-55CA-44C6-BB71-C8E504F09771}" type="datetime1">
               <a:rPr lang="de-DE" smtClean="0"/>
-              <a:t>13.03.2019</a:t>
+              <a:t>20.03.2019</a:t>
             </a:fld>
             <a:endParaRPr lang="de-DE"/>
           </a:p>
@@ -25075,11 +25047,11 @@
   <p:clrMapOvr>
     <a:masterClrMapping/>
   </p:clrMapOvr>
-  <mc:AlternateContent xmlns:mc="http://schemas.openxmlformats.org/markup-compatibility/2006" xmlns:p14="http://schemas.microsoft.com/office/powerpoint/2010/main">
-    <mc:Choice Requires="p14">
+  <mc:AlternateContent xmlns:mc="http://schemas.openxmlformats.org/markup-compatibility/2006">
+    <mc:Choice xmlns:p14="http://schemas.microsoft.com/office/powerpoint/2010/main" Requires="p14">
       <p:transition p14:dur="0"/>
     </mc:Choice>
-    <mc:Fallback xmlns="">
+    <mc:Fallback>
       <p:transition/>
     </mc:Fallback>
   </mc:AlternateContent>
@@ -25356,7 +25328,7 @@
           <a:p>
             <a:fld id="{F7E50691-51A9-4140-A0EE-65B13D20BDB0}" type="datetime1">
               <a:rPr lang="de-DE" smtClean="0"/>
-              <a:t>13.03.2019</a:t>
+              <a:t>20.03.2019</a:t>
             </a:fld>
             <a:endParaRPr lang="de-DE"/>
           </a:p>
@@ -25448,11 +25420,11 @@
   <p:clrMapOvr>
     <a:masterClrMapping/>
   </p:clrMapOvr>
-  <mc:AlternateContent xmlns:mc="http://schemas.openxmlformats.org/markup-compatibility/2006" xmlns:p14="http://schemas.microsoft.com/office/powerpoint/2010/main">
-    <mc:Choice Requires="p14">
+  <mc:AlternateContent xmlns:mc="http://schemas.openxmlformats.org/markup-compatibility/2006">
+    <mc:Choice xmlns:p14="http://schemas.microsoft.com/office/powerpoint/2010/main" Requires="p14">
       <p:transition p14:dur="0"/>
     </mc:Choice>
-    <mc:Fallback xmlns="">
+    <mc:Fallback>
       <p:transition/>
     </mc:Fallback>
   </mc:AlternateContent>
@@ -25467,7 +25439,7 @@
 </file>
 
 <file path=ppt/slides/slide53.xml><?xml version="1.0" encoding="utf-8"?>
-<p:sld xmlns:a="http://schemas.openxmlformats.org/drawingml/2006/main" xmlns:r="http://schemas.openxmlformats.org/officeDocument/2006/relationships" xmlns:p="http://schemas.openxmlformats.org/presentationml/2006/main">
+<p:sld xmlns:a="http://schemas.openxmlformats.org/drawingml/2006/main" xmlns:r="http://schemas.openxmlformats.org/officeDocument/2006/relationships" xmlns:p="http://schemas.openxmlformats.org/presentationml/2006/main" show="0">
   <p:cSld>
     <p:spTree>
       <p:nvGrpSpPr>
@@ -25591,7 +25563,7 @@
           <a:p>
             <a:fld id="{4F38BD0A-546F-41BC-82E8-2F02A3E91B8C}" type="datetime1">
               <a:rPr lang="de-DE" smtClean="0"/>
-              <a:t>13.03.2019</a:t>
+              <a:t>20.03.2019</a:t>
             </a:fld>
             <a:endParaRPr lang="de-DE"/>
           </a:p>
@@ -25689,11 +25661,11 @@
   <p:clrMapOvr>
     <a:masterClrMapping/>
   </p:clrMapOvr>
-  <mc:AlternateContent xmlns:mc="http://schemas.openxmlformats.org/markup-compatibility/2006" xmlns:p14="http://schemas.microsoft.com/office/powerpoint/2010/main">
-    <mc:Choice Requires="p14">
+  <mc:AlternateContent xmlns:mc="http://schemas.openxmlformats.org/markup-compatibility/2006">
+    <mc:Choice xmlns:p14="http://schemas.microsoft.com/office/powerpoint/2010/main" Requires="p14">
       <p:transition p14:dur="0"/>
     </mc:Choice>
-    <mc:Fallback xmlns="">
+    <mc:Fallback>
       <p:transition/>
     </mc:Fallback>
   </mc:AlternateContent>
@@ -26008,7 +25980,7 @@
           <a:p>
             <a:fld id="{93BDE5D8-0EF8-43C8-A803-F2A4680D245A}" type="datetime1">
               <a:rPr lang="de-DE" smtClean="0"/>
-              <a:t>13.03.2019</a:t>
+              <a:t>20.03.2019</a:t>
             </a:fld>
             <a:endParaRPr lang="de-DE"/>
           </a:p>
@@ -26352,7 +26324,7 @@
           <a:p>
             <a:fld id="{8D8B82FA-64B0-40BF-B50C-04C47CA9AC1D}" type="datetime1">
               <a:rPr lang="de-DE" smtClean="0"/>
-              <a:t>13.03.2019</a:t>
+              <a:t>20.03.2019</a:t>
             </a:fld>
             <a:endParaRPr lang="de-DE"/>
           </a:p>
@@ -26469,7 +26441,7 @@
 </file>
 
 <file path=ppt/slides/slide56.xml><?xml version="1.0" encoding="utf-8"?>
-<p:sld xmlns:a="http://schemas.openxmlformats.org/drawingml/2006/main" xmlns:r="http://schemas.openxmlformats.org/officeDocument/2006/relationships" xmlns:p="http://schemas.openxmlformats.org/presentationml/2006/main">
+<p:sld xmlns:a="http://schemas.openxmlformats.org/drawingml/2006/main" xmlns:r="http://schemas.openxmlformats.org/officeDocument/2006/relationships" xmlns:p="http://schemas.openxmlformats.org/presentationml/2006/main" show="0">
   <p:cSld>
     <p:spTree>
       <p:nvGrpSpPr>
@@ -26688,7 +26660,7 @@
           <a:p>
             <a:fld id="{FE3EABC3-5E07-44ED-B9F0-0D657265B4EC}" type="datetime1">
               <a:rPr lang="de-DE" smtClean="0"/>
-              <a:t>13.03.2019</a:t>
+              <a:t>20.03.2019</a:t>
             </a:fld>
             <a:endParaRPr lang="de-DE"/>
           </a:p>
@@ -26786,11 +26758,11 @@
   <p:clrMapOvr>
     <a:masterClrMapping/>
   </p:clrMapOvr>
-  <mc:AlternateContent xmlns:mc="http://schemas.openxmlformats.org/markup-compatibility/2006" xmlns:p14="http://schemas.microsoft.com/office/powerpoint/2010/main">
-    <mc:Choice Requires="p14">
+  <mc:AlternateContent xmlns:mc="http://schemas.openxmlformats.org/markup-compatibility/2006">
+    <mc:Choice xmlns:p14="http://schemas.microsoft.com/office/powerpoint/2010/main" Requires="p14">
       <p:transition p14:dur="0"/>
     </mc:Choice>
-    <mc:Fallback xmlns="">
+    <mc:Fallback>
       <p:transition/>
     </mc:Fallback>
   </mc:AlternateContent>
@@ -26805,7 +26777,7 @@
 </file>
 
 <file path=ppt/slides/slide57.xml><?xml version="1.0" encoding="utf-8"?>
-<p:sld xmlns:a="http://schemas.openxmlformats.org/drawingml/2006/main" xmlns:r="http://schemas.openxmlformats.org/officeDocument/2006/relationships" xmlns:p="http://schemas.openxmlformats.org/presentationml/2006/main">
+<p:sld xmlns:a="http://schemas.openxmlformats.org/drawingml/2006/main" xmlns:r="http://schemas.openxmlformats.org/officeDocument/2006/relationships" xmlns:p="http://schemas.openxmlformats.org/presentationml/2006/main" show="0">
   <p:cSld>
     <p:spTree>
       <p:nvGrpSpPr>
@@ -26939,7 +26911,7 @@
           <a:p>
             <a:fld id="{EB4AC1AA-53E0-448A-B2F2-C4EF9442D4CA}" type="datetime1">
               <a:rPr lang="de-DE" smtClean="0"/>
-              <a:t>13.03.2019</a:t>
+              <a:t>20.03.2019</a:t>
             </a:fld>
             <a:endParaRPr lang="de-DE"/>
           </a:p>
@@ -27001,11 +26973,11 @@
   <p:clrMapOvr>
     <a:masterClrMapping/>
   </p:clrMapOvr>
-  <mc:AlternateContent xmlns:mc="http://schemas.openxmlformats.org/markup-compatibility/2006" xmlns:p14="http://schemas.microsoft.com/office/powerpoint/2010/main">
-    <mc:Choice Requires="p14">
+  <mc:AlternateContent xmlns:mc="http://schemas.openxmlformats.org/markup-compatibility/2006">
+    <mc:Choice xmlns:p14="http://schemas.microsoft.com/office/powerpoint/2010/main" Requires="p14">
       <p:transition p14:dur="0"/>
     </mc:Choice>
-    <mc:Fallback xmlns="">
+    <mc:Fallback>
       <p:transition/>
     </mc:Fallback>
   </mc:AlternateContent>
@@ -27072,7 +27044,7 @@
         <p:spPr/>
         <p:txBody>
           <a:bodyPr>
-            <a:normAutofit fontScale="92500" lnSpcReduction="20000"/>
+            <a:normAutofit fontScale="92500" lnSpcReduction="10000"/>
           </a:bodyPr>
           <a:lstStyle/>
           <a:p>
@@ -27333,10 +27305,10 @@
           <a:p>
             <a:r>
               <a:rPr lang="de-DE" dirty="0"/>
-              <a:t>Listen / Tupel / Sets / </a:t>
-            </a:r>
-            <a:r>
-              <a:rPr lang="de-DE" dirty="0" err="1"/>
+              <a:t>Listen / Tupel / </a:t>
+            </a:r>
+            <a:r>
+              <a:rPr lang="de-DE" dirty="0" err="1" smtClean="0"/>
               <a:t>Dictionaries</a:t>
             </a:r>
             <a:r>
@@ -27451,10 +27423,14 @@
             </a:r>
             <a:r>
               <a:rPr lang="de-DE" dirty="0"/>
-              <a:t> …</a:t>
-            </a:r>
-            <a:r>
-              <a:rPr lang="de-DE" sz="2600" b="1" dirty="0">
+              <a:t> </a:t>
+            </a:r>
+            <a:r>
+              <a:rPr lang="de-DE" dirty="0" smtClean="0"/>
+              <a:t>…</a:t>
+            </a:r>
+            <a:r>
+              <a:rPr lang="de-DE" sz="2600" b="1" dirty="0" smtClean="0">
                 <a:solidFill>
                   <a:schemeClr val="accent1">
                     <a:lumMod val="75000"/>
@@ -27463,15 +27439,13 @@
               </a:rPr>
               <a:t>}</a:t>
             </a:r>
-          </a:p>
-          <a:p>
-            <a:r>
-              <a:rPr lang="de-DE" dirty="0"/>
-              <a:t>Bibliotheken</a:t>
-            </a:r>
-          </a:p>
-          <a:p>
-            <a:endParaRPr lang="de-DE" dirty="0"/>
+            <a:endParaRPr lang="de-DE" sz="2600" b="1" dirty="0">
+              <a:solidFill>
+                <a:schemeClr val="accent1">
+                  <a:lumMod val="75000"/>
+                </a:schemeClr>
+              </a:solidFill>
+            </a:endParaRPr>
           </a:p>
         </p:txBody>
       </p:sp>
@@ -27492,7 +27466,7 @@
           <a:p>
             <a:fld id="{52E05894-614A-4FA2-8964-A13B04AD0751}" type="datetime1">
               <a:rPr lang="de-DE" smtClean="0"/>
-              <a:t>13.03.2019</a:t>
+              <a:t>20.03.2019</a:t>
             </a:fld>
             <a:endParaRPr lang="de-DE"/>
           </a:p>
@@ -27653,7 +27627,7 @@
           <a:p>
             <a:fld id="{ED3B93CF-AB26-4C9F-AAA0-3F7550F03D02}" type="datetime1">
               <a:rPr lang="de-DE" smtClean="0"/>
-              <a:t>13.03.2019</a:t>
+              <a:t>20.03.2019</a:t>
             </a:fld>
             <a:endParaRPr lang="de-DE"/>
           </a:p>
@@ -27931,7 +27905,7 @@
           <a:p>
             <a:fld id="{892083D9-D1FB-4795-8ED9-565B4526F86A}" type="datetime1">
               <a:rPr lang="de-DE" smtClean="0"/>
-              <a:t>13.03.2019</a:t>
+              <a:t>20.03.2019</a:t>
             </a:fld>
             <a:endParaRPr lang="de-DE"/>
           </a:p>
@@ -28200,7 +28174,7 @@
           <a:p>
             <a:fld id="{F67820BC-C8FF-45AD-B49D-D36E11B23538}" type="datetime1">
               <a:rPr lang="de-DE" smtClean="0"/>
-              <a:t>13.03.2019</a:t>
+              <a:t>20.03.2019</a:t>
             </a:fld>
             <a:endParaRPr lang="de-DE"/>
           </a:p>
@@ -28406,7 +28380,7 @@
           <a:p>
             <a:fld id="{5B0789DE-66C1-462D-B123-D68992F3079E}" type="datetime1">
               <a:rPr lang="de-DE" smtClean="0"/>
-              <a:t>13.03.2019</a:t>
+              <a:t>20.03.2019</a:t>
             </a:fld>
             <a:endParaRPr lang="de-DE"/>
           </a:p>
@@ -28688,7 +28662,7 @@
           <a:p>
             <a:fld id="{9D3752BF-127A-43A1-9997-CD734D7352E5}" type="datetime1">
               <a:rPr lang="de-DE" smtClean="0"/>
-              <a:t>13.03.2019</a:t>
+              <a:t>20.03.2019</a:t>
             </a:fld>
             <a:endParaRPr lang="de-DE"/>
           </a:p>

</xml_diff>